<commit_message>
changes in the flowchart and PowerPoint
</commit_message>
<xml_diff>
--- a/ShipBunkerWindowsService/Documentation/WebScraperPresentation.pptx
+++ b/ShipBunkerWindowsService/Documentation/WebScraperPresentation.pptx
@@ -3578,7 +3578,7 @@
         <p:spPr>
           <a:xfrm>
             <a:off x="8869283" y="812800"/>
-            <a:ext cx="3322717" cy="3554819"/>
+            <a:ext cx="3322717" cy="4216539"/>
           </a:xfrm>
           <a:prstGeom prst="rect">
             <a:avLst/>
@@ -3592,12 +3592,24 @@
           <a:lstStyle/>
           <a:p>
             <a:r>
-              <a:rPr lang="en-US" dirty="0"/>
-              <a:t>The 5 functions that handle the logic and most of the business requirements of the Service</a:t>
-            </a:r>
-          </a:p>
-          <a:p>
-            <a:endParaRPr lang="en-US" dirty="0"/>
+              <a:rPr lang="en-US" sz="2000" dirty="0"/>
+              <a:t>The </a:t>
+            </a:r>
+            <a:r>
+              <a:rPr lang="en-US" sz="2000" dirty="0">
+                <a:solidFill>
+                  <a:srgbClr val="C00000"/>
+                </a:solidFill>
+              </a:rPr>
+              <a:t>5 functions</a:t>
+            </a:r>
+            <a:r>
+              <a:rPr lang="en-US" sz="2000" dirty="0"/>
+              <a:t> that handle the logic and most of the business requirements of the Service</a:t>
+            </a:r>
+          </a:p>
+          <a:p>
+            <a:endParaRPr lang="en-US" sz="2000" dirty="0"/>
           </a:p>
           <a:p>
             <a:pPr marL="742950" lvl="1" indent="-285750">
@@ -3608,7 +3620,7 @@
               <a:buChar char="•"/>
             </a:pPr>
             <a:r>
-              <a:rPr lang="en-US" dirty="0"/>
+              <a:rPr lang="en-US" sz="2000" dirty="0"/>
               <a:t>ValidRunningTime</a:t>
             </a:r>
           </a:p>
@@ -3621,7 +3633,7 @@
               <a:buChar char="•"/>
             </a:pPr>
             <a:r>
-              <a:rPr lang="en-US" dirty="0"/>
+              <a:rPr lang="en-US" sz="2000" dirty="0"/>
               <a:t>IsoFormatConverter</a:t>
             </a:r>
           </a:p>
@@ -3634,7 +3646,7 @@
               <a:buChar char="•"/>
             </a:pPr>
             <a:r>
-              <a:rPr lang="en-US" dirty="0"/>
+              <a:rPr lang="en-US" sz="2000" dirty="0"/>
               <a:t>DocumentLoader</a:t>
             </a:r>
           </a:p>
@@ -3647,7 +3659,7 @@
               <a:buChar char="•"/>
             </a:pPr>
             <a:r>
-              <a:rPr lang="en-US" dirty="0"/>
+              <a:rPr lang="en-US" sz="2000" dirty="0"/>
               <a:t>ScrapingLogic</a:t>
             </a:r>
           </a:p>
@@ -3660,7 +3672,7 @@
               <a:buChar char="•"/>
             </a:pPr>
             <a:r>
-              <a:rPr lang="en-US" dirty="0"/>
+              <a:rPr lang="en-US" sz="2000" dirty="0"/>
               <a:t>CsvOutput</a:t>
             </a:r>
           </a:p>
@@ -3803,7 +3815,7 @@
         <p:spPr>
           <a:xfrm>
             <a:off x="125046" y="1828799"/>
-            <a:ext cx="11769969" cy="4985980"/>
+            <a:ext cx="11769969" cy="4524315"/>
           </a:xfrm>
           <a:prstGeom prst="rect">
             <a:avLst/>
@@ -3818,11 +3830,11 @@
           <a:p>
             <a:pPr lvl="1">
               <a:lnSpc>
-                <a:spcPct val="250000"/>
+                <a:spcPct val="200000"/>
               </a:lnSpc>
             </a:pPr>
             <a:r>
-              <a:rPr lang="en-US" b="1" u="sng" dirty="0">
+              <a:rPr lang="en-US" sz="2000" b="1" u="sng" dirty="0">
                 <a:solidFill>
                   <a:srgbClr val="C00000"/>
                 </a:solidFill>
@@ -3830,7 +3842,7 @@
               <a:t>ValidRunningTime</a:t>
             </a:r>
             <a:r>
-              <a:rPr lang="en-US" u="sng" dirty="0">
+              <a:rPr lang="en-US" sz="2000" u="sng" dirty="0">
                 <a:solidFill>
                   <a:srgbClr val="C00000"/>
                 </a:solidFill>
@@ -3838,7 +3850,7 @@
               <a:t>:</a:t>
             </a:r>
             <a:r>
-              <a:rPr lang="en-US" dirty="0">
+              <a:rPr lang="en-US" sz="2000" dirty="0">
                 <a:solidFill>
                   <a:srgbClr val="C00000"/>
                 </a:solidFill>
@@ -3846,10 +3858,10 @@
               <a:t> </a:t>
             </a:r>
             <a:r>
-              <a:rPr lang="en-US" dirty="0"/>
-              <a:t>Handles the important condition about the running times/days of the service. It is used frequently to ensure the adherence to our business requirements</a:t>
-            </a:r>
-            <a:endParaRPr lang="en-US" u="sng" dirty="0">
+              <a:rPr lang="en-US" sz="2000" dirty="0"/>
+              <a:t>Handles the important condition about the running times and days of the service. It is used in every interval to ensure the adherence to our business requirements</a:t>
+            </a:r>
+            <a:endParaRPr lang="en-US" sz="2000" u="sng" dirty="0">
               <a:solidFill>
                 <a:srgbClr val="C00000"/>
               </a:solidFill>
@@ -3858,11 +3870,11 @@
           <a:p>
             <a:pPr lvl="1">
               <a:lnSpc>
-                <a:spcPct val="250000"/>
+                <a:spcPct val="200000"/>
               </a:lnSpc>
             </a:pPr>
             <a:r>
-              <a:rPr lang="en-US" b="1" u="sng" dirty="0">
+              <a:rPr lang="en-US" sz="2000" b="1" u="sng" dirty="0">
                 <a:solidFill>
                   <a:srgbClr val="C00000"/>
                 </a:solidFill>
@@ -3870,7 +3882,7 @@
               <a:t>IsoFormatConverter</a:t>
             </a:r>
             <a:r>
-              <a:rPr lang="en-US" u="sng" dirty="0">
+              <a:rPr lang="en-US" sz="2000" u="sng" dirty="0">
                 <a:solidFill>
                   <a:srgbClr val="C00000"/>
                 </a:solidFill>
@@ -3878,7 +3890,7 @@
               <a:t>:</a:t>
             </a:r>
             <a:r>
-              <a:rPr lang="en-US" dirty="0">
+              <a:rPr lang="en-US" sz="2000" dirty="0">
                 <a:solidFill>
                   <a:srgbClr val="C00000"/>
                 </a:solidFill>
@@ -3886,10 +3898,10 @@
               <a:t> </a:t>
             </a:r>
             <a:r>
-              <a:rPr lang="en-US" dirty="0"/>
+              <a:rPr lang="en-US" sz="2000" dirty="0"/>
               <a:t>Converts the date column that we scraped, into ISO time format</a:t>
             </a:r>
-            <a:endParaRPr lang="en-US" u="sng" dirty="0">
+            <a:endParaRPr lang="en-US" sz="2000" u="sng" dirty="0">
               <a:solidFill>
                 <a:srgbClr val="C00000"/>
               </a:solidFill>
@@ -3898,11 +3910,11 @@
           <a:p>
             <a:pPr lvl="1">
               <a:lnSpc>
-                <a:spcPct val="250000"/>
+                <a:spcPct val="200000"/>
               </a:lnSpc>
             </a:pPr>
             <a:r>
-              <a:rPr lang="en-US" b="1" u="sng" dirty="0">
+              <a:rPr lang="en-US" sz="2000" b="1" u="sng" dirty="0">
                 <a:solidFill>
                   <a:srgbClr val="C00000"/>
                 </a:solidFill>
@@ -3910,7 +3922,7 @@
               <a:t>DocumentLoader</a:t>
             </a:r>
             <a:r>
-              <a:rPr lang="en-US" u="sng" dirty="0">
+              <a:rPr lang="en-US" sz="2000" u="sng" dirty="0">
                 <a:solidFill>
                   <a:srgbClr val="C00000"/>
                 </a:solidFill>
@@ -3918,7 +3930,7 @@
               <a:t>:</a:t>
             </a:r>
             <a:r>
-              <a:rPr lang="en-US" dirty="0">
+              <a:rPr lang="en-US" sz="2000" dirty="0">
                 <a:solidFill>
                   <a:srgbClr val="C00000"/>
                 </a:solidFill>
@@ -3926,10 +3938,10 @@
               <a:t> </a:t>
             </a:r>
             <a:r>
-              <a:rPr lang="en-US" dirty="0"/>
+              <a:rPr lang="en-US" sz="2000" dirty="0"/>
               <a:t>Loads the website about to be scraped into HTML Document through the site’s URL </a:t>
             </a:r>
-            <a:endParaRPr lang="en-US" u="sng" dirty="0">
+            <a:endParaRPr lang="en-US" sz="2000" u="sng" dirty="0">
               <a:solidFill>
                 <a:srgbClr val="C00000"/>
               </a:solidFill>
@@ -3938,11 +3950,11 @@
           <a:p>
             <a:pPr lvl="1">
               <a:lnSpc>
-                <a:spcPct val="250000"/>
+                <a:spcPct val="200000"/>
               </a:lnSpc>
             </a:pPr>
             <a:r>
-              <a:rPr lang="en-US" b="1" u="sng" dirty="0">
+              <a:rPr lang="en-US" sz="2000" b="1" u="sng" dirty="0">
                 <a:solidFill>
                   <a:srgbClr val="C00000"/>
                 </a:solidFill>
@@ -3950,7 +3962,7 @@
               <a:t>ScrapingLogic</a:t>
             </a:r>
             <a:r>
-              <a:rPr lang="en-US" u="sng" dirty="0">
+              <a:rPr lang="en-US" sz="2000" u="sng" dirty="0">
                 <a:solidFill>
                   <a:srgbClr val="C00000"/>
                 </a:solidFill>
@@ -3958,7 +3970,7 @@
               <a:t>:</a:t>
             </a:r>
             <a:r>
-              <a:rPr lang="en-US" dirty="0">
+              <a:rPr lang="en-US" sz="2000" dirty="0">
                 <a:solidFill>
                   <a:srgbClr val="C00000"/>
                 </a:solidFill>
@@ -3966,10 +3978,10 @@
               <a:t> </a:t>
             </a:r>
             <a:r>
-              <a:rPr lang="en-US" dirty="0"/>
+              <a:rPr lang="en-US" sz="2000" dirty="0"/>
               <a:t>Handles the scraping of the data from the loaded Html Document and places them into a List</a:t>
             </a:r>
-            <a:endParaRPr lang="en-US" u="sng" dirty="0">
+            <a:endParaRPr lang="en-US" sz="2000" u="sng" dirty="0">
               <a:solidFill>
                 <a:srgbClr val="C00000"/>
               </a:solidFill>
@@ -3978,11 +3990,11 @@
           <a:p>
             <a:pPr lvl="1">
               <a:lnSpc>
-                <a:spcPct val="250000"/>
+                <a:spcPct val="200000"/>
               </a:lnSpc>
             </a:pPr>
             <a:r>
-              <a:rPr lang="en-US" b="1" u="sng" dirty="0">
+              <a:rPr lang="en-US" sz="2000" b="1" u="sng" dirty="0">
                 <a:solidFill>
                   <a:srgbClr val="C00000"/>
                 </a:solidFill>
@@ -3990,7 +4002,7 @@
               <a:t>CsvOutput</a:t>
             </a:r>
             <a:r>
-              <a:rPr lang="en-US" u="sng" dirty="0">
+              <a:rPr lang="en-US" sz="2000" u="sng" dirty="0">
                 <a:solidFill>
                   <a:srgbClr val="C00000"/>
                 </a:solidFill>
@@ -3998,10 +4010,10 @@
               <a:t>:</a:t>
             </a:r>
             <a:r>
-              <a:rPr lang="en-US" dirty="0"/>
+              <a:rPr lang="en-US" sz="2000" dirty="0"/>
               <a:t>  Exports the scraped data into a csv file, with the desired format.</a:t>
             </a:r>
-            <a:endParaRPr lang="en-US" u="sng" dirty="0">
+            <a:endParaRPr lang="en-US" sz="2000" u="sng" dirty="0">
               <a:solidFill>
                 <a:srgbClr val="C00000"/>
               </a:solidFill>
@@ -4724,27 +4736,7 @@
                   </a:schemeClr>
                 </a:solidFill>
               </a:rPr>
-              <a:t>any automated analytical technique aimed at analyzing text and data in digital form in order to generate </a:t>
-            </a:r>
-            <a:r>
-              <a:rPr lang="en-US">
-                <a:solidFill>
-                  <a:schemeClr val="accent1">
-                    <a:lumMod val="75000"/>
-                  </a:schemeClr>
-                </a:solidFill>
-              </a:rPr>
-              <a:t>information 	 	 which </a:t>
-            </a:r>
-            <a:r>
-              <a:rPr lang="en-US" dirty="0">
-                <a:solidFill>
-                  <a:schemeClr val="accent1">
-                    <a:lumMod val="75000"/>
-                  </a:schemeClr>
-                </a:solidFill>
-              </a:rPr>
-              <a:t>includes, but is not limited to, patterns, trends and correlations</a:t>
+              <a:t>any automated analytical technique aimed at analyzing text and data in digital form in order to generate information 	 	 which includes, but is not limited to, patterns, trends and correlations</a:t>
             </a:r>
             <a:r>
               <a:rPr lang="en-US" dirty="0"/>
@@ -4867,7 +4859,7 @@
         <p:spPr>
           <a:xfrm>
             <a:off x="0" y="2032000"/>
-            <a:ext cx="6096000" cy="3293209"/>
+            <a:ext cx="6096000" cy="3693319"/>
           </a:xfrm>
           <a:prstGeom prst="rect">
             <a:avLst/>
@@ -4881,18 +4873,18 @@
           <a:lstStyle/>
           <a:p>
             <a:r>
-              <a:rPr lang="en-US" sz="1600" b="1" dirty="0"/>
+              <a:rPr lang="en-US" b="1" dirty="0"/>
               <a:t>Web scraping(w.s)</a:t>
             </a:r>
             <a:r>
-              <a:rPr lang="en-US" sz="1600" dirty="0"/>
+              <a:rPr lang="en-US" dirty="0"/>
               <a:t> is a data gathering technique used for extracting information from websites. Web scraping software may directly access one or multiple websites to gather valuable, publicly available information for commercial or research purposes. It is a form of copying in which specific data is gathered and copied from the web, typically into a central local database or spreadsheet, for later retrieval or analysis.</a:t>
             </a:r>
           </a:p>
           <a:p>
             <a:r>
-              <a:rPr lang="en-US" sz="1600" dirty="0"/>
-              <a:t>Web scrapers typically take something out of a page, to make use of it for another purpose somewhere else. There are 3 main scraping methods:</a:t>
+              <a:rPr lang="en-US" dirty="0"/>
+              <a:t>Web scrapers typically take something out of a page, to make use of it for another purpose. There are 3 main scraping methods:</a:t>
             </a:r>
           </a:p>
           <a:p>
@@ -4901,7 +4893,7 @@
               <a:buAutoNum type="arabicPeriod"/>
             </a:pPr>
             <a:r>
-              <a:rPr lang="en-US" sz="1600" dirty="0"/>
+              <a:rPr lang="en-US" dirty="0"/>
               <a:t>Screen scraping </a:t>
             </a:r>
           </a:p>
@@ -4911,7 +4903,7 @@
               <a:buAutoNum type="arabicPeriod"/>
             </a:pPr>
             <a:r>
-              <a:rPr lang="en-US" sz="1600" dirty="0"/>
+              <a:rPr lang="en-US" dirty="0"/>
               <a:t>Dynamic Scraping </a:t>
             </a:r>
           </a:p>
@@ -4921,7 +4913,7 @@
               <a:buAutoNum type="arabicPeriod"/>
             </a:pPr>
             <a:r>
-              <a:rPr lang="en-US" sz="1600" dirty="0">
+              <a:rPr lang="en-US" dirty="0">
                 <a:solidFill>
                   <a:srgbClr val="C00000"/>
                 </a:solidFill>
@@ -4929,7 +4921,7 @@
               <a:t>Static scraping </a:t>
             </a:r>
             <a:r>
-              <a:rPr lang="en-US" sz="1600" dirty="0">
+              <a:rPr lang="en-US" dirty="0">
                 <a:solidFill>
                   <a:srgbClr val="C00000"/>
                 </a:solidFill>
@@ -4937,7 +4929,7 @@
               </a:rPr>
               <a:t> our case</a:t>
             </a:r>
-            <a:endParaRPr lang="en-US" sz="1600" dirty="0">
+            <a:endParaRPr lang="en-US" dirty="0">
               <a:solidFill>
                 <a:srgbClr val="C00000"/>
               </a:solidFill>
@@ -4960,7 +4952,7 @@
         <p:spPr>
           <a:xfrm>
             <a:off x="6096000" y="1571229"/>
-            <a:ext cx="5642707" cy="4308872"/>
+            <a:ext cx="5642707" cy="5078313"/>
           </a:xfrm>
           <a:prstGeom prst="rect">
             <a:avLst/>
@@ -4992,22 +4984,14 @@
           </a:p>
           <a:p>
             <a:r>
-              <a:rPr lang="en-US" sz="1600" dirty="0"/>
-              <a:t>Static web scraping involves the gathering of static elements of a website, like tables or plain text. It is a the most basic form of web scraping, since the elements do not change with user activity or events and popups.</a:t>
-            </a:r>
-          </a:p>
-          <a:p>
-            <a:r>
-              <a:rPr lang="en-US" sz="1600" dirty="0"/>
-              <a:t>It involves all the same procedures as any other form of </a:t>
-            </a:r>
-            <a:r>
-              <a:rPr lang="en-US" sz="1600" dirty="0" err="1"/>
-              <a:t>w.s</a:t>
-            </a:r>
-            <a:r>
-              <a:rPr lang="en-US" sz="1600" dirty="0"/>
-              <a:t>:</a:t>
+              <a:rPr lang="en-US" dirty="0"/>
+              <a:t>Static web scraping involves the gathering of static elements of a website, like tables or plain text. It is the most basic form of web scraping, since the elements do not change with user activity or events and popups.</a:t>
+            </a:r>
+          </a:p>
+          <a:p>
+            <a:r>
+              <a:rPr lang="en-US" dirty="0"/>
+              <a:t>It involves…</a:t>
             </a:r>
           </a:p>
           <a:p>
@@ -5016,11 +5000,11 @@
               <a:buChar char="•"/>
             </a:pPr>
             <a:r>
-              <a:rPr lang="en-US" sz="1600" dirty="0"/>
+              <a:rPr lang="en-US" dirty="0"/>
               <a:t>First, we </a:t>
             </a:r>
             <a:r>
-              <a:rPr lang="en-US" sz="1600" dirty="0">
+              <a:rPr lang="en-US" dirty="0">
                 <a:solidFill>
                   <a:srgbClr val="C00000"/>
                 </a:solidFill>
@@ -5028,7 +5012,7 @@
               <a:t>fetch</a:t>
             </a:r>
             <a:r>
-              <a:rPr lang="en-US" sz="1600" dirty="0"/>
+              <a:rPr lang="en-US" dirty="0"/>
               <a:t> a website through its URL</a:t>
             </a:r>
           </a:p>
@@ -5038,11 +5022,11 @@
               <a:buChar char="•"/>
             </a:pPr>
             <a:r>
-              <a:rPr lang="en-US" sz="1600" dirty="0"/>
+              <a:rPr lang="en-US" dirty="0"/>
               <a:t>Second, we </a:t>
             </a:r>
             <a:r>
-              <a:rPr lang="en-US" sz="1600" dirty="0">
+              <a:rPr lang="en-US" dirty="0">
                 <a:solidFill>
                   <a:srgbClr val="C00000"/>
                 </a:solidFill>
@@ -5050,7 +5034,7 @@
               <a:t>load</a:t>
             </a:r>
             <a:r>
-              <a:rPr lang="en-US" sz="1600" dirty="0"/>
+              <a:rPr lang="en-US" dirty="0"/>
               <a:t> it into an Html Document, which is an appropriate form for the scraping to take place</a:t>
             </a:r>
           </a:p>
@@ -5060,11 +5044,11 @@
               <a:buChar char="•"/>
             </a:pPr>
             <a:r>
-              <a:rPr lang="en-US" sz="1600" dirty="0"/>
+              <a:rPr lang="en-US" dirty="0"/>
               <a:t>We select via </a:t>
             </a:r>
             <a:r>
-              <a:rPr lang="en-US" sz="1600" dirty="0">
+              <a:rPr lang="en-US" dirty="0">
                 <a:solidFill>
                   <a:srgbClr val="C00000"/>
                 </a:solidFill>
@@ -5072,7 +5056,7 @@
               <a:t>Xpath signature</a:t>
             </a:r>
             <a:r>
-              <a:rPr lang="en-US" sz="1600" dirty="0"/>
+              <a:rPr lang="en-US" dirty="0"/>
               <a:t>, the particular element we want to gather data from</a:t>
             </a:r>
           </a:p>
@@ -5082,7 +5066,7 @@
               <a:buChar char="•"/>
             </a:pPr>
             <a:r>
-              <a:rPr lang="en-US" sz="1600" dirty="0">
+              <a:rPr lang="en-US" dirty="0">
                 <a:solidFill>
                   <a:srgbClr val="C00000"/>
                 </a:solidFill>
@@ -5090,7 +5074,7 @@
               <a:t>Perform the scraping </a:t>
             </a:r>
             <a:r>
-              <a:rPr lang="en-US" sz="1600" dirty="0"/>
+              <a:rPr lang="en-US" dirty="0"/>
               <a:t>and gathering of the data into an appropriate data structure (e.g. List)</a:t>
             </a:r>
           </a:p>
@@ -5100,7 +5084,7 @@
               <a:buChar char="•"/>
             </a:pPr>
             <a:r>
-              <a:rPr lang="en-US" sz="1600" dirty="0">
+              <a:rPr lang="en-US" dirty="0">
                 <a:solidFill>
                   <a:srgbClr val="C00000"/>
                 </a:solidFill>
@@ -5108,7 +5092,7 @@
               <a:t>Export the results</a:t>
             </a:r>
             <a:r>
-              <a:rPr lang="en-US" sz="1600" dirty="0"/>
+              <a:rPr lang="en-US" dirty="0"/>
               <a:t> of the process, formatted or not, into a file format of your choice (e.g a Csv file) or a database.</a:t>
             </a:r>
           </a:p>
@@ -5117,7 +5101,7 @@
               <a:buFont typeface="Arial" panose="020B0604020202020204" pitchFamily="34" charset="0"/>
               <a:buChar char="•"/>
             </a:pPr>
-            <a:endParaRPr lang="en-US" sz="1400" dirty="0"/>
+            <a:endParaRPr lang="en-US" dirty="0"/>
           </a:p>
         </p:txBody>
       </p:sp>
@@ -5228,8 +5212,8 @@
         </p:blipFill>
         <p:spPr>
           <a:xfrm>
-            <a:off x="8548088" y="1443862"/>
-            <a:ext cx="3518865" cy="2313061"/>
+            <a:off x="8417170" y="1443862"/>
+            <a:ext cx="3649783" cy="2313061"/>
           </a:xfrm>
           <a:prstGeom prst="rect">
             <a:avLst/>
@@ -5299,8 +5283,8 @@
         </p:blipFill>
         <p:spPr>
           <a:xfrm>
-            <a:off x="8548089" y="3688862"/>
-            <a:ext cx="3518864" cy="2711938"/>
+            <a:off x="8417170" y="3688862"/>
+            <a:ext cx="3649783" cy="2711938"/>
           </a:xfrm>
           <a:prstGeom prst="rect">
             <a:avLst/>
@@ -5337,7 +5321,7 @@
           <a:p>
             <a:r>
               <a:rPr lang="en-US" dirty="0"/>
-              <a:t>(Left)The website I chose to collect data from is called </a:t>
+              <a:t>(Left)The website I collected data from is called </a:t>
             </a:r>
             <a:r>
               <a:rPr lang="en-US" dirty="0">
@@ -5541,7 +5525,7 @@
           <a:p>
             <a:r>
               <a:rPr lang="en-US" dirty="0"/>
-              <a:t>The vast majority of the data inputs required for the implementation of the service is handled and passed through the </a:t>
+              <a:t>The vast majority of the data inputs required for the implementation of the service, is handled and passed through the </a:t>
             </a:r>
             <a:r>
               <a:rPr lang="en-US" dirty="0">
@@ -5670,8 +5654,8 @@
         </p:nvSpPr>
         <p:spPr>
           <a:xfrm>
-            <a:off x="171939" y="1767006"/>
-            <a:ext cx="4994031" cy="2739211"/>
+            <a:off x="171939" y="1699894"/>
+            <a:ext cx="11690093" cy="2031325"/>
           </a:xfrm>
           <a:prstGeom prst="rect">
             <a:avLst/>
@@ -5685,11 +5669,11 @@
           <a:lstStyle/>
           <a:p>
             <a:r>
-              <a:rPr lang="en-US" sz="1600" dirty="0"/>
+              <a:rPr lang="en-US" dirty="0"/>
               <a:t>The project was accomplished with the use of a </a:t>
             </a:r>
             <a:r>
-              <a:rPr lang="en-US" sz="1600" dirty="0">
+              <a:rPr lang="en-US" dirty="0">
                 <a:solidFill>
                   <a:srgbClr val="C00000"/>
                 </a:solidFill>
@@ -5697,21 +5681,21 @@
               <a:t>worker service </a:t>
             </a:r>
             <a:r>
-              <a:rPr lang="en-US" sz="1600" dirty="0"/>
-              <a:t>(from Visual Studio template files). A timer  is present to enforce the running interval of the service and it runs continuously in the background. After confirming its correct running, through testing, the service was published in a local folder.</a:t>
-            </a:r>
-          </a:p>
-          <a:p>
-            <a:r>
-              <a:rPr lang="en-US" sz="1600" dirty="0"/>
-              <a:t>Then, after registering the project as a windows service, I had it running continuously as a background service through the Windows “Services” capability.  </a:t>
-            </a:r>
-          </a:p>
-          <a:p>
-            <a:endParaRPr lang="en-US" sz="1400" dirty="0"/>
-          </a:p>
-          <a:p>
-            <a:endParaRPr lang="el-GR" sz="1400" dirty="0"/>
+              <a:rPr lang="en-US" dirty="0"/>
+              <a:t>(from Visual Studio template files). A timer  is present to enforce the running interval of the service and it runs continuously in the background. After confirming its functioning as intended through testing, the service was published in a local folder.</a:t>
+            </a:r>
+          </a:p>
+          <a:p>
+            <a:r>
+              <a:rPr lang="en-US" dirty="0"/>
+              <a:t>Then, after registering the project as a Windows service, I had it running continuously at the background through the Windows “Services” capability.  </a:t>
+            </a:r>
+          </a:p>
+          <a:p>
+            <a:endParaRPr lang="en-US" dirty="0"/>
+          </a:p>
+          <a:p>
+            <a:endParaRPr lang="el-GR" dirty="0"/>
           </a:p>
         </p:txBody>
       </p:sp>
@@ -5729,8 +5713,8 @@
         </p:nvSpPr>
         <p:spPr>
           <a:xfrm>
-            <a:off x="78155" y="4506217"/>
-            <a:ext cx="5924061" cy="1569660"/>
+            <a:off x="171938" y="3600206"/>
+            <a:ext cx="11690093" cy="923330"/>
           </a:xfrm>
           <a:prstGeom prst="rect">
             <a:avLst/>
@@ -5744,11 +5728,11 @@
           <a:lstStyle/>
           <a:p>
             <a:r>
-              <a:rPr lang="en-US" sz="1600" dirty="0"/>
+              <a:rPr lang="en-US" dirty="0"/>
               <a:t>For </a:t>
             </a:r>
             <a:r>
-              <a:rPr lang="en-US" sz="1600" dirty="0">
+              <a:rPr lang="en-US" dirty="0">
                 <a:solidFill>
                   <a:srgbClr val="C00000"/>
                 </a:solidFill>
@@ -5756,53 +5740,13 @@
               <a:t>logging purposes, Serilog</a:t>
             </a:r>
             <a:r>
-              <a:rPr lang="en-US" sz="1600" dirty="0"/>
-              <a:t> and its complimentary packages were used, bypassing the default Visual Studio console logging capacities. The Logger, exports its messages into a simple “.txt” file and it ensures better debugging and understanding of the progress of the service. To the right, is the setup of the Logger, in 2 environments, DEBUG and RELEASE</a:t>
-            </a:r>
-            <a:r>
-              <a:rPr lang="en-US" sz="1400" dirty="0"/>
-              <a:t>.</a:t>
-            </a:r>
-            <a:endParaRPr lang="el-GR" sz="1400" dirty="0"/>
-          </a:p>
-        </p:txBody>
-      </p:sp>
-      <p:pic>
-        <p:nvPicPr>
-          <p:cNvPr id="6" name="Picture 5">
-            <a:extLst>
-              <a:ext uri="{FF2B5EF4-FFF2-40B4-BE49-F238E27FC236}">
-                <a16:creationId xmlns:a16="http://schemas.microsoft.com/office/drawing/2014/main" id="{E6F79704-370C-4C56-993D-73F1574526DC}"/>
-              </a:ext>
-            </a:extLst>
-          </p:cNvPr>
-          <p:cNvPicPr>
-            <a:picLocks noChangeAspect="1"/>
-          </p:cNvPicPr>
-          <p:nvPr/>
-        </p:nvPicPr>
-        <p:blipFill>
-          <a:blip r:embed="rId2">
-            <a:extLst>
-              <a:ext uri="{28A0092B-C50C-407E-A947-70E740481C1C}">
-                <a14:useLocalDpi xmlns:a14="http://schemas.microsoft.com/office/drawing/2010/main" val="0"/>
-              </a:ext>
-            </a:extLst>
-          </a:blip>
-          <a:stretch>
-            <a:fillRect/>
-          </a:stretch>
-        </p:blipFill>
-        <p:spPr>
-          <a:xfrm>
-            <a:off x="6189785" y="1767006"/>
-            <a:ext cx="5830276" cy="4618163"/>
-          </a:xfrm>
-          <a:prstGeom prst="rect">
-            <a:avLst/>
-          </a:prstGeom>
-        </p:spPr>
-      </p:pic>
+              <a:rPr lang="en-US" dirty="0"/>
+              <a:t> and its complimentary packages were used, instead of the Visual Studio console logging capacities. The Logger, exports its messages into a simple “.txt” file and it ensures better debugging and understanding of the progress of the service. It reports messages in when both when things go well or fail.</a:t>
+            </a:r>
+            <a:endParaRPr lang="el-GR" dirty="0"/>
+          </a:p>
+        </p:txBody>
+      </p:sp>
     </p:spTree>
     <p:extLst>
       <p:ext uri="{BB962C8B-B14F-4D97-AF65-F5344CB8AC3E}">
@@ -6092,7 +6036,7 @@
           <a:p>
             <a:r>
               <a:rPr lang="en-US" dirty="0"/>
-              <a:t>The other 2 output files that the app produces are 2 separate .csv files in the current working directory, titled “Mgo.csv” and “Vlsfo.csv”. They contain the scraped data that we gathered and are updated every time the worker service running interval is reached.  Below is a snippet from both of the files.</a:t>
+              <a:t>The other 2 output files that the app produces are 2 separate .csv files in the current working directory, titled “Mgo.csv” and “Vlsfo.csv”. They contain the scraped data that we gathered and are updated every time the worker service execution interval is reached. </a:t>
             </a:r>
             <a:endParaRPr lang="el-GR" dirty="0"/>
           </a:p>
@@ -6228,7 +6172,7 @@
         <p:spPr>
           <a:xfrm>
             <a:off x="125046" y="1828799"/>
-            <a:ext cx="11769969" cy="4154984"/>
+            <a:ext cx="11769969" cy="4216539"/>
           </a:xfrm>
           <a:prstGeom prst="rect">
             <a:avLst/>
@@ -6243,11 +6187,11 @@
           <a:p>
             <a:pPr algn="just"/>
             <a:r>
-              <a:rPr lang="en-US" sz="1600" dirty="0"/>
+              <a:rPr lang="en-US" sz="2000" dirty="0"/>
               <a:t>The </a:t>
             </a:r>
             <a:r>
-              <a:rPr lang="en-US" sz="1600" dirty="0">
+              <a:rPr lang="en-US" sz="2000" dirty="0">
                 <a:solidFill>
                   <a:srgbClr val="C00000"/>
                 </a:solidFill>
@@ -6255,7 +6199,7 @@
               <a:t>business requirements</a:t>
             </a:r>
             <a:r>
-              <a:rPr lang="en-US" sz="1600" dirty="0"/>
+              <a:rPr lang="en-US" sz="2000" dirty="0"/>
               <a:t> for this project are stated below. </a:t>
             </a:r>
           </a:p>
@@ -6273,7 +6217,19 @@
             </a:pPr>
             <a:r>
               <a:rPr lang="en-US" dirty="0"/>
-              <a:t>The app. must have the capacity to run in the background as a Windows Service .</a:t>
+              <a:t>The application must have the capacity to run in the background as a </a:t>
+            </a:r>
+            <a:r>
+              <a:rPr lang="en-US" dirty="0">
+                <a:solidFill>
+                  <a:srgbClr val="C00000"/>
+                </a:solidFill>
+              </a:rPr>
+              <a:t>Windows Service</a:t>
+            </a:r>
+            <a:r>
+              <a:rPr lang="en-US" dirty="0"/>
+              <a:t> .</a:t>
             </a:r>
           </a:p>
           <a:p>
@@ -6286,7 +6242,19 @@
             </a:pPr>
             <a:r>
               <a:rPr lang="en-US" dirty="0"/>
-              <a:t>It should be collecting and refreshing when changes happen, the 2 aforementioned </a:t>
+              <a:t>It should be </a:t>
+            </a:r>
+            <a:r>
+              <a:rPr lang="en-US" dirty="0">
+                <a:solidFill>
+                  <a:srgbClr val="C00000"/>
+                </a:solidFill>
+              </a:rPr>
+              <a:t>collecting and refreshing</a:t>
+            </a:r>
+            <a:r>
+              <a:rPr lang="en-US" dirty="0"/>
+              <a:t> its output, when changes happen to the 2 aforementioned </a:t>
             </a:r>
             <a:r>
               <a:rPr lang="en-US" dirty="0">
@@ -6306,7 +6274,7 @@
             </a:r>
             <a:r>
               <a:rPr lang="en-US" dirty="0"/>
-              <a:t> global average prices from the </a:t>
+              <a:t> global average prices tables from the </a:t>
             </a:r>
             <a:r>
               <a:rPr lang="en-US" dirty="0">
@@ -6329,7 +6297,31 @@
             </a:pPr>
             <a:r>
               <a:rPr lang="en-US" dirty="0"/>
-              <a:t>It should be scraping the columns “Date, Price $/mt, High, Low” from those tables and store the data in the form of 2 separate csv files.</a:t>
+              <a:t>It should be scraping the columns </a:t>
+            </a:r>
+            <a:r>
+              <a:rPr lang="en-US" dirty="0">
+                <a:solidFill>
+                  <a:srgbClr val="C00000"/>
+                </a:solidFill>
+              </a:rPr>
+              <a:t>“Date, Price $/mt, High, Low” </a:t>
+            </a:r>
+            <a:r>
+              <a:rPr lang="en-US" dirty="0"/>
+              <a:t>from those tables and store the data in the form of 2 separate </a:t>
+            </a:r>
+            <a:r>
+              <a:rPr lang="en-US" dirty="0">
+                <a:solidFill>
+                  <a:srgbClr val="C00000"/>
+                </a:solidFill>
+              </a:rPr>
+              <a:t>csv files</a:t>
+            </a:r>
+            <a:r>
+              <a:rPr lang="en-US" dirty="0"/>
+              <a:t>.</a:t>
             </a:r>
           </a:p>
           <a:p>
@@ -6342,7 +6334,19 @@
             </a:pPr>
             <a:r>
               <a:rPr lang="en-US" dirty="0"/>
-              <a:t>The “Date” column’s data must be formatted to be exhibited in the ISO time Format.</a:t>
+              <a:t>The “Date” column’s data must be formatted to be exhibited in the </a:t>
+            </a:r>
+            <a:r>
+              <a:rPr lang="en-US" dirty="0">
+                <a:solidFill>
+                  <a:srgbClr val="C00000"/>
+                </a:solidFill>
+              </a:rPr>
+              <a:t>ISO time Format</a:t>
+            </a:r>
+            <a:r>
+              <a:rPr lang="en-US" dirty="0"/>
+              <a:t>.</a:t>
             </a:r>
           </a:p>
           <a:p>
@@ -6355,7 +6359,19 @@
             </a:pPr>
             <a:r>
               <a:rPr lang="en-US" dirty="0"/>
-              <a:t>The scraping should be happening in a 30 minute interval between the allotted time span.</a:t>
+              <a:t>The scraping should be happening in a </a:t>
+            </a:r>
+            <a:r>
+              <a:rPr lang="en-US" dirty="0">
+                <a:solidFill>
+                  <a:srgbClr val="C00000"/>
+                </a:solidFill>
+              </a:rPr>
+              <a:t>30 minute interval</a:t>
+            </a:r>
+            <a:r>
+              <a:rPr lang="en-US" dirty="0"/>
+              <a:t> between the allotted time span.</a:t>
             </a:r>
           </a:p>
           <a:p>
@@ -6368,7 +6384,19 @@
             </a:pPr>
             <a:r>
               <a:rPr lang="en-US" dirty="0"/>
-              <a:t>The running period of the service should be between 9:30 and 21:30 in UTC time format, from Monday to Friday.</a:t>
+              <a:t>The </a:t>
+            </a:r>
+            <a:r>
+              <a:rPr lang="en-US" dirty="0">
+                <a:solidFill>
+                  <a:srgbClr val="C00000"/>
+                </a:solidFill>
+              </a:rPr>
+              <a:t>running period </a:t>
+            </a:r>
+            <a:r>
+              <a:rPr lang="en-US" dirty="0"/>
+              <a:t>of the service should be between 9:30 and 21:30 in UTC time format, from Monday to Friday.</a:t>
             </a:r>
           </a:p>
           <a:p>
@@ -6474,7 +6502,7 @@
         <p:spPr>
           <a:xfrm>
             <a:off x="1" y="1828799"/>
-            <a:ext cx="3634154" cy="2762551"/>
+            <a:ext cx="3634154" cy="3470437"/>
           </a:xfrm>
           <a:prstGeom prst="rect">
             <a:avLst/>
@@ -6493,13 +6521,13 @@
               <a:t> </a:t>
             </a:r>
             <a:r>
-              <a:rPr lang="en-US" sz="1600" u="sng" dirty="0"/>
+              <a:rPr lang="en-US" u="sng" dirty="0"/>
               <a:t>Points of interest</a:t>
             </a:r>
           </a:p>
           <a:p>
             <a:pPr algn="just"/>
-            <a:endParaRPr lang="en-US" sz="1600" u="sng" dirty="0"/>
+            <a:endParaRPr lang="en-US" u="sng" dirty="0"/>
           </a:p>
           <a:p>
             <a:pPr marL="285750" indent="-285750" algn="just">
@@ -6510,7 +6538,7 @@
               <a:buChar char="•"/>
             </a:pPr>
             <a:r>
-              <a:rPr lang="en-US" sz="1600" dirty="0"/>
+              <a:rPr lang="en-US" dirty="0"/>
               <a:t>The ValidRunning Time condition for running the process </a:t>
             </a:r>
           </a:p>
@@ -6523,7 +6551,7 @@
               <a:buChar char="•"/>
             </a:pPr>
             <a:r>
-              <a:rPr lang="en-US" sz="1600" dirty="0"/>
+              <a:rPr lang="en-US" dirty="0"/>
               <a:t>The 3 processes in the rectangle that handle the scraping operation</a:t>
             </a:r>
           </a:p>
@@ -6536,7 +6564,7 @@
               <a:buChar char="•"/>
             </a:pPr>
             <a:r>
-              <a:rPr lang="en-US" sz="1600" dirty="0"/>
+              <a:rPr lang="en-US" dirty="0"/>
               <a:t>The 3 output documents </a:t>
             </a:r>
           </a:p>
@@ -6556,10 +6584,10 @@
       </p:sp>
       <p:pic>
         <p:nvPicPr>
-          <p:cNvPr id="4" name="Picture 3">
+          <p:cNvPr id="5" name="Picture 4">
             <a:extLst>
               <a:ext uri="{FF2B5EF4-FFF2-40B4-BE49-F238E27FC236}">
-                <a16:creationId xmlns:a16="http://schemas.microsoft.com/office/drawing/2014/main" id="{F11D6614-BA03-4FFF-9E9D-D11581551EA7}"/>
+                <a16:creationId xmlns:a16="http://schemas.microsoft.com/office/drawing/2014/main" id="{1F1507BB-750F-45AC-A5F5-5B0F189B4D3C}"/>
               </a:ext>
             </a:extLst>
           </p:cNvPr>
@@ -6582,8 +6610,8 @@
         </p:blipFill>
         <p:spPr>
           <a:xfrm>
-            <a:off x="4001477" y="500185"/>
-            <a:ext cx="7659077" cy="5689600"/>
+            <a:off x="4157696" y="0"/>
+            <a:ext cx="7933635" cy="6199464"/>
           </a:xfrm>
           <a:prstGeom prst="rect">
             <a:avLst/>

</xml_diff>